<commit_message>
old docker demo updates
</commit_message>
<xml_diff>
--- a/dbas-docker-guide/dbas-docker-guide v1.pptx
+++ b/dbas-docker-guide/dbas-docker-guide v1.pptx
@@ -262,7 +262,7 @@
           <a:p>
             <a:fld id="{48B9CA49-2710-433E-ABB8-A4798B0CF6D4}" type="datetimeFigureOut">
               <a:rPr lang="en-US" smtClean="0"/>
-              <a:t>5/13/2019</a:t>
+              <a:t>5/15/2019</a:t>
             </a:fld>
             <a:endParaRPr lang="en-US"/>
           </a:p>
@@ -428,7 +428,7 @@
             <a:fld id="{21FB4422-3DC8-45BE-B0A0-D87D16501A8D}" type="datetimeFigureOut">
               <a:rPr lang="en-US" smtClean="0"/>
               <a:pPr/>
-              <a:t>5/13/2019</a:t>
+              <a:t>5/15/2019</a:t>
             </a:fld>
             <a:endParaRPr lang="en-US" dirty="0"/>
           </a:p>
@@ -11619,7 +11619,7 @@
           <a:p>
             <a:r>
               <a:rPr lang="en-GB" dirty="0"/>
-              <a:t>At the moment not very well</a:t>
+              <a:t>So far not very well</a:t>
             </a:r>
             <a:br>
               <a:rPr lang="en-GB" dirty="0"/>
@@ -25574,7 +25574,7 @@
                                     </p:set>
                                     <p:animEffect transition="in" filter="fade">
                                       <p:cBhvr>
-                                        <p:cTn id="7" dur="500"/>
+                                        <p:cTn id="7" dur="1000"/>
                                         <p:tgtEl>
                                           <p:spTgt spid="2052"/>
                                         </p:tgtEl>
@@ -25586,21 +25586,30 @@
                             </p:childTnLst>
                           </p:cTn>
                         </p:par>
+                      </p:childTnLst>
+                    </p:cTn>
+                  </p:par>
+                  <p:par>
+                    <p:cTn id="8" fill="hold">
+                      <p:stCondLst>
+                        <p:cond delay="indefinite"/>
+                      </p:stCondLst>
+                      <p:childTnLst>
                         <p:par>
-                          <p:cTn id="8" fill="hold">
+                          <p:cTn id="9" fill="hold">
                             <p:stCondLst>
-                              <p:cond delay="1000"/>
+                              <p:cond delay="0"/>
                             </p:stCondLst>
                             <p:childTnLst>
                               <p:par>
-                                <p:cTn id="9" presetID="10" presetClass="entr" presetSubtype="0" fill="hold" nodeType="afterEffect">
+                                <p:cTn id="10" presetID="10" presetClass="entr" presetSubtype="0" fill="hold" nodeType="clickEffect">
                                   <p:stCondLst>
-                                    <p:cond delay="500"/>
+                                    <p:cond delay="0"/>
                                   </p:stCondLst>
                                   <p:childTnLst>
                                     <p:set>
                                       <p:cBhvr>
-                                        <p:cTn id="10" dur="1" fill="hold">
+                                        <p:cTn id="11" dur="1" fill="hold">
                                           <p:stCondLst>
                                             <p:cond delay="0"/>
                                           </p:stCondLst>
@@ -25618,7 +25627,7 @@
                                     </p:set>
                                     <p:animEffect transition="in" filter="fade">
                                       <p:cBhvr>
-                                        <p:cTn id="11" dur="2000"/>
+                                        <p:cTn id="12" dur="1000"/>
                                         <p:tgtEl>
                                           <p:spTgt spid="2072"/>
                                         </p:tgtEl>
@@ -25631,20 +25640,20 @@
                           </p:cTn>
                         </p:par>
                         <p:par>
-                          <p:cTn id="12" fill="hold">
+                          <p:cTn id="13" fill="hold">
                             <p:stCondLst>
-                              <p:cond delay="3500"/>
+                              <p:cond delay="1000"/>
                             </p:stCondLst>
                             <p:childTnLst>
                               <p:par>
-                                <p:cTn id="13" presetID="10" presetClass="entr" presetSubtype="0" fill="hold" nodeType="afterEffect">
+                                <p:cTn id="14" presetID="10" presetClass="entr" presetSubtype="0" fill="hold" nodeType="afterEffect">
                                   <p:stCondLst>
                                     <p:cond delay="500"/>
                                   </p:stCondLst>
                                   <p:childTnLst>
                                     <p:set>
                                       <p:cBhvr>
-                                        <p:cTn id="14" dur="1" fill="hold">
+                                        <p:cTn id="15" dur="1" fill="hold">
                                           <p:stCondLst>
                                             <p:cond delay="0"/>
                                           </p:stCondLst>
@@ -25662,7 +25671,7 @@
                                     </p:set>
                                     <p:animEffect transition="in" filter="fade">
                                       <p:cBhvr>
-                                        <p:cTn id="15" dur="2000"/>
+                                        <p:cTn id="16" dur="1000"/>
                                         <p:tgtEl>
                                           <p:spTgt spid="2054"/>
                                         </p:tgtEl>
@@ -25675,20 +25684,20 @@
                           </p:cTn>
                         </p:par>
                         <p:par>
-                          <p:cTn id="16" fill="hold">
+                          <p:cTn id="17" fill="hold">
                             <p:stCondLst>
-                              <p:cond delay="6000"/>
+                              <p:cond delay="2500"/>
                             </p:stCondLst>
                             <p:childTnLst>
                               <p:par>
-                                <p:cTn id="17" presetID="10" presetClass="entr" presetSubtype="0" fill="hold" nodeType="afterEffect">
+                                <p:cTn id="18" presetID="10" presetClass="entr" presetSubtype="0" fill="hold" nodeType="afterEffect">
                                   <p:stCondLst>
                                     <p:cond delay="500"/>
                                   </p:stCondLst>
                                   <p:childTnLst>
                                     <p:set>
                                       <p:cBhvr>
-                                        <p:cTn id="18" dur="1" fill="hold">
+                                        <p:cTn id="19" dur="1" fill="hold">
                                           <p:stCondLst>
                                             <p:cond delay="0"/>
                                           </p:stCondLst>
@@ -25706,7 +25715,7 @@
                                     </p:set>
                                     <p:animEffect transition="in" filter="fade">
                                       <p:cBhvr>
-                                        <p:cTn id="19" dur="2900"/>
+                                        <p:cTn id="20" dur="1000"/>
                                         <p:tgtEl>
                                           <p:spTgt spid="2090"/>
                                         </p:tgtEl>
@@ -25719,20 +25728,20 @@
                           </p:cTn>
                         </p:par>
                         <p:par>
-                          <p:cTn id="20" fill="hold">
+                          <p:cTn id="21" fill="hold">
                             <p:stCondLst>
-                              <p:cond delay="9400"/>
+                              <p:cond delay="4000"/>
                             </p:stCondLst>
                             <p:childTnLst>
                               <p:par>
-                                <p:cTn id="21" presetID="10" presetClass="entr" presetSubtype="0" fill="hold" nodeType="afterEffect">
+                                <p:cTn id="22" presetID="10" presetClass="entr" presetSubtype="0" fill="hold" nodeType="afterEffect">
                                   <p:stCondLst>
                                     <p:cond delay="500"/>
                                   </p:stCondLst>
                                   <p:childTnLst>
                                     <p:set>
                                       <p:cBhvr>
-                                        <p:cTn id="22" dur="1" fill="hold">
+                                        <p:cTn id="23" dur="1" fill="hold">
                                           <p:stCondLst>
                                             <p:cond delay="0"/>
                                           </p:stCondLst>
@@ -25750,7 +25759,7 @@
                                     </p:set>
                                     <p:animEffect transition="in" filter="fade">
                                       <p:cBhvr>
-                                        <p:cTn id="23" dur="2000"/>
+                                        <p:cTn id="24" dur="1000"/>
                                         <p:tgtEl>
                                           <p:spTgt spid="2058"/>
                                         </p:tgtEl>
@@ -25766,26 +25775,26 @@
                     </p:cTn>
                   </p:par>
                   <p:par>
-                    <p:cTn id="24" fill="hold">
+                    <p:cTn id="25" fill="hold">
                       <p:stCondLst>
                         <p:cond delay="indefinite"/>
                       </p:stCondLst>
                       <p:childTnLst>
                         <p:par>
-                          <p:cTn id="25" fill="hold">
+                          <p:cTn id="26" fill="hold">
                             <p:stCondLst>
                               <p:cond delay="0"/>
                             </p:stCondLst>
                             <p:childTnLst>
                               <p:par>
-                                <p:cTn id="26" presetID="10" presetClass="entr" presetSubtype="0" fill="hold" nodeType="clickEffect">
+                                <p:cTn id="27" presetID="10" presetClass="entr" presetSubtype="0" fill="hold" nodeType="clickEffect">
                                   <p:stCondLst>
                                     <p:cond delay="500"/>
                                   </p:stCondLst>
                                   <p:childTnLst>
                                     <p:set>
                                       <p:cBhvr>
-                                        <p:cTn id="27" dur="1" fill="hold">
+                                        <p:cTn id="28" dur="1" fill="hold">
                                           <p:stCondLst>
                                             <p:cond delay="0"/>
                                           </p:stCondLst>
@@ -25803,7 +25812,7 @@
                                     </p:set>
                                     <p:animEffect transition="in" filter="fade">
                                       <p:cBhvr>
-                                        <p:cTn id="28" dur="2000"/>
+                                        <p:cTn id="29" dur="1000"/>
                                         <p:tgtEl>
                                           <p:spTgt spid="2078"/>
                                         </p:tgtEl>
@@ -25816,20 +25825,20 @@
                           </p:cTn>
                         </p:par>
                         <p:par>
-                          <p:cTn id="29" fill="hold">
+                          <p:cTn id="30" fill="hold">
                             <p:stCondLst>
-                              <p:cond delay="2500"/>
+                              <p:cond delay="1500"/>
                             </p:stCondLst>
                             <p:childTnLst>
                               <p:par>
-                                <p:cTn id="30" presetID="10" presetClass="entr" presetSubtype="0" fill="hold" nodeType="afterEffect">
+                                <p:cTn id="31" presetID="10" presetClass="entr" presetSubtype="0" fill="hold" nodeType="afterEffect">
                                   <p:stCondLst>
                                     <p:cond delay="500"/>
                                   </p:stCondLst>
                                   <p:childTnLst>
                                     <p:set>
                                       <p:cBhvr>
-                                        <p:cTn id="31" dur="1" fill="hold">
+                                        <p:cTn id="32" dur="1" fill="hold">
                                           <p:stCondLst>
                                             <p:cond delay="0"/>
                                           </p:stCondLst>
@@ -25847,7 +25856,7 @@
                                     </p:set>
                                     <p:animEffect transition="in" filter="fade">
                                       <p:cBhvr>
-                                        <p:cTn id="32" dur="2000"/>
+                                        <p:cTn id="33" dur="1000"/>
                                         <p:tgtEl>
                                           <p:spTgt spid="2060"/>
                                         </p:tgtEl>
@@ -25860,20 +25869,20 @@
                           </p:cTn>
                         </p:par>
                         <p:par>
-                          <p:cTn id="33" fill="hold">
+                          <p:cTn id="34" fill="hold">
                             <p:stCondLst>
-                              <p:cond delay="5000"/>
+                              <p:cond delay="3000"/>
                             </p:stCondLst>
                             <p:childTnLst>
                               <p:par>
-                                <p:cTn id="34" presetID="10" presetClass="entr" presetSubtype="0" fill="hold" nodeType="afterEffect">
+                                <p:cTn id="35" presetID="10" presetClass="entr" presetSubtype="0" fill="hold" nodeType="afterEffect">
                                   <p:stCondLst>
                                     <p:cond delay="500"/>
                                   </p:stCondLst>
                                   <p:childTnLst>
                                     <p:set>
                                       <p:cBhvr>
-                                        <p:cTn id="35" dur="1" fill="hold">
+                                        <p:cTn id="36" dur="1" fill="hold">
                                           <p:stCondLst>
                                             <p:cond delay="0"/>
                                           </p:stCondLst>
@@ -25891,7 +25900,7 @@
                                     </p:set>
                                     <p:animEffect transition="in" filter="fade">
                                       <p:cBhvr>
-                                        <p:cTn id="36" dur="2000"/>
+                                        <p:cTn id="37" dur="1000"/>
                                         <p:tgtEl>
                                           <p:spTgt spid="2080"/>
                                         </p:tgtEl>
@@ -25907,26 +25916,26 @@
                     </p:cTn>
                   </p:par>
                   <p:par>
-                    <p:cTn id="37" fill="hold">
+                    <p:cTn id="38" fill="hold">
                       <p:stCondLst>
                         <p:cond delay="indefinite"/>
                       </p:stCondLst>
                       <p:childTnLst>
                         <p:par>
-                          <p:cTn id="38" fill="hold">
+                          <p:cTn id="39" fill="hold">
                             <p:stCondLst>
                               <p:cond delay="0"/>
                             </p:stCondLst>
                             <p:childTnLst>
                               <p:par>
-                                <p:cTn id="39" presetID="10" presetClass="entr" presetSubtype="0" fill="hold" nodeType="clickEffect">
+                                <p:cTn id="40" presetID="10" presetClass="entr" presetSubtype="0" fill="hold" nodeType="clickEffect">
                                   <p:stCondLst>
                                     <p:cond delay="500"/>
                                   </p:stCondLst>
                                   <p:childTnLst>
                                     <p:set>
                                       <p:cBhvr>
-                                        <p:cTn id="40" dur="1" fill="hold">
+                                        <p:cTn id="41" dur="1" fill="hold">
                                           <p:stCondLst>
                                             <p:cond delay="0"/>
                                           </p:stCondLst>
@@ -25944,7 +25953,7 @@
                                     </p:set>
                                     <p:animEffect transition="in" filter="fade">
                                       <p:cBhvr>
-                                        <p:cTn id="41" dur="2000"/>
+                                        <p:cTn id="42" dur="1000"/>
                                         <p:tgtEl>
                                           <p:spTgt spid="2070"/>
                                         </p:tgtEl>
@@ -25957,20 +25966,20 @@
                           </p:cTn>
                         </p:par>
                         <p:par>
-                          <p:cTn id="42" fill="hold">
+                          <p:cTn id="43" fill="hold">
                             <p:stCondLst>
-                              <p:cond delay="2500"/>
+                              <p:cond delay="1500"/>
                             </p:stCondLst>
                             <p:childTnLst>
                               <p:par>
-                                <p:cTn id="43" presetID="10" presetClass="entr" presetSubtype="0" fill="hold" nodeType="afterEffect">
+                                <p:cTn id="44" presetID="10" presetClass="entr" presetSubtype="0" fill="hold" nodeType="afterEffect">
                                   <p:stCondLst>
                                     <p:cond delay="500"/>
                                   </p:stCondLst>
                                   <p:childTnLst>
                                     <p:set>
                                       <p:cBhvr>
-                                        <p:cTn id="44" dur="1" fill="hold">
+                                        <p:cTn id="45" dur="1" fill="hold">
                                           <p:stCondLst>
                                             <p:cond delay="0"/>
                                           </p:stCondLst>
@@ -25988,7 +25997,7 @@
                                     </p:set>
                                     <p:animEffect transition="in" filter="fade">
                                       <p:cBhvr>
-                                        <p:cTn id="45" dur="2000"/>
+                                        <p:cTn id="46" dur="1000"/>
                                         <p:tgtEl>
                                           <p:spTgt spid="2064"/>
                                         </p:tgtEl>
@@ -25998,14 +26007,14 @@
                                 </p:cTn>
                               </p:par>
                               <p:par>
-                                <p:cTn id="46" presetID="10" presetClass="entr" presetSubtype="0" fill="hold" nodeType="withEffect">
+                                <p:cTn id="47" presetID="10" presetClass="entr" presetSubtype="0" fill="hold" nodeType="withEffect">
                                   <p:stCondLst>
                                     <p:cond delay="500"/>
                                   </p:stCondLst>
                                   <p:childTnLst>
                                     <p:set>
                                       <p:cBhvr>
-                                        <p:cTn id="47" dur="1" fill="hold">
+                                        <p:cTn id="48" dur="1" fill="hold">
                                           <p:stCondLst>
                                             <p:cond delay="0"/>
                                           </p:stCondLst>
@@ -26023,7 +26032,7 @@
                                     </p:set>
                                     <p:animEffect transition="in" filter="fade">
                                       <p:cBhvr>
-                                        <p:cTn id="48" dur="2000"/>
+                                        <p:cTn id="49" dur="1000"/>
                                         <p:tgtEl>
                                           <p:spTgt spid="2082"/>
                                         </p:tgtEl>
@@ -26039,26 +26048,26 @@
                     </p:cTn>
                   </p:par>
                   <p:par>
-                    <p:cTn id="49" fill="hold">
+                    <p:cTn id="50" fill="hold">
                       <p:stCondLst>
                         <p:cond delay="indefinite"/>
                       </p:stCondLst>
                       <p:childTnLst>
                         <p:par>
-                          <p:cTn id="50" fill="hold">
+                          <p:cTn id="51" fill="hold">
                             <p:stCondLst>
                               <p:cond delay="0"/>
                             </p:stCondLst>
                             <p:childTnLst>
                               <p:par>
-                                <p:cTn id="51" presetID="10" presetClass="entr" presetSubtype="0" fill="hold" nodeType="clickEffect">
+                                <p:cTn id="52" presetID="10" presetClass="entr" presetSubtype="0" fill="hold" nodeType="clickEffect">
                                   <p:stCondLst>
                                     <p:cond delay="500"/>
                                   </p:stCondLst>
                                   <p:childTnLst>
                                     <p:set>
                                       <p:cBhvr>
-                                        <p:cTn id="52" dur="1" fill="hold">
+                                        <p:cTn id="53" dur="1" fill="hold">
                                           <p:stCondLst>
                                             <p:cond delay="0"/>
                                           </p:stCondLst>
@@ -26076,7 +26085,7 @@
                                     </p:set>
                                     <p:animEffect transition="in" filter="fade">
                                       <p:cBhvr>
-                                        <p:cTn id="53" dur="2000"/>
+                                        <p:cTn id="54" dur="1000"/>
                                         <p:tgtEl>
                                           <p:spTgt spid="2074"/>
                                         </p:tgtEl>
@@ -26089,20 +26098,20 @@
                           </p:cTn>
                         </p:par>
                         <p:par>
-                          <p:cTn id="54" fill="hold">
+                          <p:cTn id="55" fill="hold">
                             <p:stCondLst>
-                              <p:cond delay="2500"/>
+                              <p:cond delay="1500"/>
                             </p:stCondLst>
                             <p:childTnLst>
                               <p:par>
-                                <p:cTn id="55" presetID="10" presetClass="entr" presetSubtype="0" fill="hold" nodeType="afterEffect">
+                                <p:cTn id="56" presetID="10" presetClass="entr" presetSubtype="0" fill="hold" nodeType="afterEffect">
                                   <p:stCondLst>
                                     <p:cond delay="500"/>
                                   </p:stCondLst>
                                   <p:childTnLst>
                                     <p:set>
                                       <p:cBhvr>
-                                        <p:cTn id="56" dur="1" fill="hold">
+                                        <p:cTn id="57" dur="1" fill="hold">
                                           <p:stCondLst>
                                             <p:cond delay="0"/>
                                           </p:stCondLst>
@@ -26120,7 +26129,7 @@
                                     </p:set>
                                     <p:animEffect transition="in" filter="fade">
                                       <p:cBhvr>
-                                        <p:cTn id="57" dur="2000"/>
+                                        <p:cTn id="58" dur="1000"/>
                                         <p:tgtEl>
                                           <p:spTgt spid="2084"/>
                                         </p:tgtEl>
@@ -26133,20 +26142,20 @@
                           </p:cTn>
                         </p:par>
                         <p:par>
-                          <p:cTn id="58" fill="hold">
+                          <p:cTn id="59" fill="hold">
                             <p:stCondLst>
-                              <p:cond delay="5000"/>
+                              <p:cond delay="3000"/>
                             </p:stCondLst>
                             <p:childTnLst>
                               <p:par>
-                                <p:cTn id="59" presetID="10" presetClass="entr" presetSubtype="0" fill="hold" nodeType="afterEffect">
+                                <p:cTn id="60" presetID="10" presetClass="entr" presetSubtype="0" fill="hold" nodeType="afterEffect">
                                   <p:stCondLst>
                                     <p:cond delay="500"/>
                                   </p:stCondLst>
                                   <p:childTnLst>
                                     <p:set>
                                       <p:cBhvr>
-                                        <p:cTn id="60" dur="1" fill="hold">
+                                        <p:cTn id="61" dur="1" fill="hold">
                                           <p:stCondLst>
                                             <p:cond delay="0"/>
                                           </p:stCondLst>
@@ -26164,7 +26173,7 @@
                                     </p:set>
                                     <p:animEffect transition="in" filter="fade">
                                       <p:cBhvr>
-                                        <p:cTn id="61" dur="2000"/>
+                                        <p:cTn id="62" dur="1000"/>
                                         <p:tgtEl>
                                           <p:spTgt spid="2076"/>
                                         </p:tgtEl>
@@ -26180,26 +26189,26 @@
                     </p:cTn>
                   </p:par>
                   <p:par>
-                    <p:cTn id="62" fill="hold">
+                    <p:cTn id="63" fill="hold">
                       <p:stCondLst>
                         <p:cond delay="indefinite"/>
                       </p:stCondLst>
                       <p:childTnLst>
                         <p:par>
-                          <p:cTn id="63" fill="hold">
+                          <p:cTn id="64" fill="hold">
                             <p:stCondLst>
                               <p:cond delay="0"/>
                             </p:stCondLst>
                             <p:childTnLst>
                               <p:par>
-                                <p:cTn id="64" presetID="10" presetClass="entr" presetSubtype="0" fill="hold" nodeType="clickEffect">
+                                <p:cTn id="65" presetID="10" presetClass="entr" presetSubtype="0" fill="hold" nodeType="clickEffect">
                                   <p:stCondLst>
                                     <p:cond delay="500"/>
                                   </p:stCondLst>
                                   <p:childTnLst>
                                     <p:set>
                                       <p:cBhvr>
-                                        <p:cTn id="65" dur="1" fill="hold">
+                                        <p:cTn id="66" dur="1" fill="hold">
                                           <p:stCondLst>
                                             <p:cond delay="0"/>
                                           </p:stCondLst>
@@ -26217,7 +26226,7 @@
                                     </p:set>
                                     <p:animEffect transition="in" filter="fade">
                                       <p:cBhvr>
-                                        <p:cTn id="66" dur="2000"/>
+                                        <p:cTn id="67" dur="1000"/>
                                         <p:tgtEl>
                                           <p:spTgt spid="2086"/>
                                         </p:tgtEl>
@@ -26230,20 +26239,20 @@
                           </p:cTn>
                         </p:par>
                         <p:par>
-                          <p:cTn id="67" fill="hold">
+                          <p:cTn id="68" fill="hold">
                             <p:stCondLst>
-                              <p:cond delay="2500"/>
+                              <p:cond delay="1500"/>
                             </p:stCondLst>
                             <p:childTnLst>
                               <p:par>
-                                <p:cTn id="68" presetID="10" presetClass="entr" presetSubtype="0" fill="hold" nodeType="afterEffect">
+                                <p:cTn id="69" presetID="10" presetClass="entr" presetSubtype="0" fill="hold" nodeType="afterEffect">
                                   <p:stCondLst>
                                     <p:cond delay="500"/>
                                   </p:stCondLst>
                                   <p:childTnLst>
                                     <p:set>
                                       <p:cBhvr>
-                                        <p:cTn id="69" dur="1" fill="hold">
+                                        <p:cTn id="70" dur="1" fill="hold">
                                           <p:stCondLst>
                                             <p:cond delay="0"/>
                                           </p:stCondLst>
@@ -26261,7 +26270,7 @@
                                     </p:set>
                                     <p:animEffect transition="in" filter="fade">
                                       <p:cBhvr>
-                                        <p:cTn id="70" dur="2000"/>
+                                        <p:cTn id="71" dur="1000"/>
                                         <p:tgtEl>
                                           <p:spTgt spid="26"/>
                                         </p:tgtEl>
@@ -26274,20 +26283,20 @@
                           </p:cTn>
                         </p:par>
                         <p:par>
-                          <p:cTn id="71" fill="hold">
+                          <p:cTn id="72" fill="hold">
                             <p:stCondLst>
-                              <p:cond delay="5000"/>
+                              <p:cond delay="3000"/>
                             </p:stCondLst>
                             <p:childTnLst>
                               <p:par>
-                                <p:cTn id="72" presetID="10" presetClass="entr" presetSubtype="0" fill="hold" nodeType="afterEffect">
+                                <p:cTn id="73" presetID="10" presetClass="entr" presetSubtype="0" fill="hold" nodeType="afterEffect">
                                   <p:stCondLst>
                                     <p:cond delay="500"/>
                                   </p:stCondLst>
                                   <p:childTnLst>
                                     <p:set>
                                       <p:cBhvr>
-                                        <p:cTn id="73" dur="1" fill="hold">
+                                        <p:cTn id="74" dur="1" fill="hold">
                                           <p:stCondLst>
                                             <p:cond delay="0"/>
                                           </p:stCondLst>
@@ -26305,7 +26314,7 @@
                                     </p:set>
                                     <p:animEffect transition="in" filter="fade">
                                       <p:cBhvr>
-                                        <p:cTn id="74" dur="2000"/>
+                                        <p:cTn id="75" dur="1000"/>
                                         <p:tgtEl>
                                           <p:spTgt spid="2088"/>
                                         </p:tgtEl>
@@ -26321,26 +26330,26 @@
                     </p:cTn>
                   </p:par>
                   <p:par>
-                    <p:cTn id="75" fill="hold">
+                    <p:cTn id="76" fill="hold">
                       <p:stCondLst>
                         <p:cond delay="indefinite"/>
                       </p:stCondLst>
                       <p:childTnLst>
                         <p:par>
-                          <p:cTn id="76" fill="hold">
+                          <p:cTn id="77" fill="hold">
                             <p:stCondLst>
                               <p:cond delay="0"/>
                             </p:stCondLst>
                             <p:childTnLst>
                               <p:par>
-                                <p:cTn id="77" presetID="10" presetClass="entr" presetSubtype="0" fill="hold" grpId="0" nodeType="clickEffect">
+                                <p:cTn id="78" presetID="10" presetClass="entr" presetSubtype="0" fill="hold" grpId="0" nodeType="clickEffect">
                                   <p:stCondLst>
                                     <p:cond delay="500"/>
                                   </p:stCondLst>
                                   <p:childTnLst>
                                     <p:set>
                                       <p:cBhvr>
-                                        <p:cTn id="78" dur="1" fill="hold">
+                                        <p:cTn id="79" dur="1" fill="hold">
                                           <p:stCondLst>
                                             <p:cond delay="0"/>
                                           </p:stCondLst>
@@ -26358,7 +26367,7 @@
                                     </p:set>
                                     <p:animEffect transition="in" filter="fade">
                                       <p:cBhvr>
-                                        <p:cTn id="79" dur="2000"/>
+                                        <p:cTn id="80" dur="1000"/>
                                         <p:tgtEl>
                                           <p:spTgt spid="28"/>
                                         </p:tgtEl>
@@ -26374,26 +26383,26 @@
                     </p:cTn>
                   </p:par>
                   <p:par>
-                    <p:cTn id="80" fill="hold">
+                    <p:cTn id="81" fill="hold">
                       <p:stCondLst>
                         <p:cond delay="indefinite"/>
                       </p:stCondLst>
                       <p:childTnLst>
                         <p:par>
-                          <p:cTn id="81" fill="hold">
+                          <p:cTn id="82" fill="hold">
                             <p:stCondLst>
                               <p:cond delay="0"/>
                             </p:stCondLst>
                             <p:childTnLst>
                               <p:par>
-                                <p:cTn id="82" presetID="10" presetClass="entr" presetSubtype="0" fill="hold" nodeType="clickEffect">
+                                <p:cTn id="83" presetID="10" presetClass="entr" presetSubtype="0" fill="hold" nodeType="clickEffect">
                                   <p:stCondLst>
                                     <p:cond delay="500"/>
                                   </p:stCondLst>
                                   <p:childTnLst>
                                     <p:set>
                                       <p:cBhvr>
-                                        <p:cTn id="83" dur="1" fill="hold">
+                                        <p:cTn id="84" dur="1" fill="hold">
                                           <p:stCondLst>
                                             <p:cond delay="0"/>
                                           </p:stCondLst>
@@ -26411,7 +26420,7 @@
                                     </p:set>
                                     <p:animEffect transition="in" filter="fade">
                                       <p:cBhvr>
-                                        <p:cTn id="84" dur="2000"/>
+                                        <p:cTn id="85" dur="1000"/>
                                         <p:tgtEl>
                                           <p:spTgt spid="29"/>
                                         </p:tgtEl>

</xml_diff>